<commit_message>
Final paper and presentation added.
</commit_message>
<xml_diff>
--- a/FinalMoneypadPowerpoint.pptx
+++ b/FinalMoneypadPowerpoint.pptx
@@ -519,7 +519,7 @@
             <a:fld id="{81174F84-7A56-4EBE-A4F9-513CBF214038}" type="datetimeFigureOut">
               <a:rPr lang="en-US" smtClean="0"/>
               <a:pPr/>
-              <a:t>5/3/2023</a:t>
+              <a:t>5/6/2023</a:t>
             </a:fld>
             <a:endParaRPr lang="en-US"/>
           </a:p>
@@ -685,7 +685,7 @@
             <a:fld id="{81174F84-7A56-4EBE-A4F9-513CBF214038}" type="datetimeFigureOut">
               <a:rPr lang="en-US" smtClean="0"/>
               <a:pPr/>
-              <a:t>5/3/2023</a:t>
+              <a:t>5/6/2023</a:t>
             </a:fld>
             <a:endParaRPr lang="en-US"/>
           </a:p>
@@ -861,7 +861,7 @@
             <a:fld id="{81174F84-7A56-4EBE-A4F9-513CBF214038}" type="datetimeFigureOut">
               <a:rPr lang="en-US" smtClean="0"/>
               <a:pPr/>
-              <a:t>5/3/2023</a:t>
+              <a:t>5/6/2023</a:t>
             </a:fld>
             <a:endParaRPr lang="en-US"/>
           </a:p>
@@ -1031,7 +1031,7 @@
             <a:fld id="{81174F84-7A56-4EBE-A4F9-513CBF214038}" type="datetimeFigureOut">
               <a:rPr lang="en-US" smtClean="0"/>
               <a:pPr/>
-              <a:t>5/3/2023</a:t>
+              <a:t>5/6/2023</a:t>
             </a:fld>
             <a:endParaRPr lang="en-US"/>
           </a:p>
@@ -1487,7 +1487,7 @@
             <a:fld id="{81174F84-7A56-4EBE-A4F9-513CBF214038}" type="datetimeFigureOut">
               <a:rPr lang="en-US" smtClean="0"/>
               <a:pPr/>
-              <a:t>5/3/2023</a:t>
+              <a:t>5/6/2023</a:t>
             </a:fld>
             <a:endParaRPr lang="en-US"/>
           </a:p>
@@ -1752,7 +1752,7 @@
             <a:fld id="{81174F84-7A56-4EBE-A4F9-513CBF214038}" type="datetimeFigureOut">
               <a:rPr lang="en-US" smtClean="0"/>
               <a:pPr/>
-              <a:t>5/3/2023</a:t>
+              <a:t>5/6/2023</a:t>
             </a:fld>
             <a:endParaRPr lang="en-US"/>
           </a:p>
@@ -2127,7 +2127,7 @@
             <a:fld id="{81174F84-7A56-4EBE-A4F9-513CBF214038}" type="datetimeFigureOut">
               <a:rPr lang="en-US" smtClean="0"/>
               <a:pPr/>
-              <a:t>5/3/2023</a:t>
+              <a:t>5/6/2023</a:t>
             </a:fld>
             <a:endParaRPr lang="en-US"/>
           </a:p>
@@ -2250,7 +2250,7 @@
             <a:fld id="{81174F84-7A56-4EBE-A4F9-513CBF214038}" type="datetimeFigureOut">
               <a:rPr lang="en-US" smtClean="0"/>
               <a:pPr/>
-              <a:t>5/3/2023</a:t>
+              <a:t>5/6/2023</a:t>
             </a:fld>
             <a:endParaRPr lang="en-US"/>
           </a:p>
@@ -2342,7 +2342,7 @@
             <a:fld id="{81174F84-7A56-4EBE-A4F9-513CBF214038}" type="datetimeFigureOut">
               <a:rPr lang="en-US" smtClean="0"/>
               <a:pPr/>
-              <a:t>5/3/2023</a:t>
+              <a:t>5/6/2023</a:t>
             </a:fld>
             <a:endParaRPr lang="en-US"/>
           </a:p>
@@ -2592,7 +2592,7 @@
             <a:fld id="{81174F84-7A56-4EBE-A4F9-513CBF214038}" type="datetimeFigureOut">
               <a:rPr lang="en-US" smtClean="0"/>
               <a:pPr/>
-              <a:t>5/3/2023</a:t>
+              <a:t>5/6/2023</a:t>
             </a:fld>
             <a:endParaRPr lang="en-US"/>
           </a:p>
@@ -2852,7 +2852,7 @@
             <a:fld id="{81174F84-7A56-4EBE-A4F9-513CBF214038}" type="datetimeFigureOut">
               <a:rPr lang="en-US" smtClean="0"/>
               <a:pPr/>
-              <a:t>5/3/2023</a:t>
+              <a:t>5/6/2023</a:t>
             </a:fld>
             <a:endParaRPr lang="en-US"/>
           </a:p>
@@ -3256,7 +3256,7 @@
             <a:fld id="{81174F84-7A56-4EBE-A4F9-513CBF214038}" type="datetimeFigureOut">
               <a:rPr lang="en-US" smtClean="0"/>
               <a:pPr/>
-              <a:t>5/3/2023</a:t>
+              <a:t>5/6/2023</a:t>
             </a:fld>
             <a:endParaRPr lang="en-US"/>
           </a:p>
@@ -3858,15 +3858,6 @@
               <a:t>: Integration Testing</a:t>
             </a:r>
           </a:p>
-          <a:p>
-            <a:endParaRPr lang="en-US" sz="3400" dirty="0"/>
-          </a:p>
-          <a:p>
-            <a:r>
-              <a:rPr lang="en-US" sz="3400" dirty="0"/>
-              <a:t>ALL FINISHED</a:t>
-            </a:r>
-          </a:p>
         </p:txBody>
       </p:sp>
     </p:spTree>
@@ -4182,7 +4173,34 @@
           <a:bodyPr/>
           <a:lstStyle/>
           <a:p>
-            <a:endParaRPr lang="en-US" dirty="0"/>
+            <a:r>
+              <a:rPr lang="en-US" dirty="0"/>
+              <a:t>Removed search bar from stock page</a:t>
+            </a:r>
+          </a:p>
+          <a:p>
+            <a:r>
+              <a:rPr lang="en-US" dirty="0"/>
+              <a:t>Removed notifications from stock page</a:t>
+            </a:r>
+          </a:p>
+          <a:p>
+            <a:r>
+              <a:rPr lang="en-US" dirty="0"/>
+              <a:t>Added a feature to be able to click the stock name, that brings the user to yahoo finance.</a:t>
+            </a:r>
+          </a:p>
+          <a:p>
+            <a:r>
+              <a:rPr lang="en-US" dirty="0"/>
+              <a:t>Added an admin page</a:t>
+            </a:r>
+          </a:p>
+          <a:p>
+            <a:r>
+              <a:rPr lang="en-US" dirty="0"/>
+              <a:t>Combined Transactions and Expenses into one component</a:t>
+            </a:r>
           </a:p>
         </p:txBody>
       </p:sp>
@@ -4399,7 +4417,7 @@
         <p:spPr/>
         <p:txBody>
           <a:bodyPr>
-            <a:normAutofit/>
+            <a:normAutofit fontScale="92500" lnSpcReduction="10000"/>
           </a:bodyPr>
           <a:lstStyle/>
           <a:p>
@@ -4442,6 +4460,12 @@
             <a:r>
               <a:rPr lang="en-US" dirty="0"/>
               <a:t>What I delivered</a:t>
+            </a:r>
+          </a:p>
+          <a:p>
+            <a:r>
+              <a:rPr lang="en-US" dirty="0"/>
+              <a:t>Amendments</a:t>
             </a:r>
           </a:p>
           <a:p>

</xml_diff>